<commit_message>
refined evaluate_solution's interface to  include fixed and uncertainty parameters.
</commit_message>
<xml_diff>
--- a/070_SimpleARM/docs/scenarios.pptx
+++ b/070_SimpleARM/docs/scenarios.pptx
@@ -105,6 +105,11 @@
       </a:defRPr>
     </a:lvl9pPr>
   </p:defaultTextStyle>
+  <p:extLst>
+    <p:ext uri="{EFAFB233-063F-42B5-8137-9DF3F51BA10A}">
+      <p15:sldGuideLst xmlns:p15="http://schemas.microsoft.com/office/powerpoint/2012/main"/>
+    </p:ext>
+  </p:extLst>
 </p:presentation>
 </file>
 
@@ -257,7 +262,7 @@
           <a:p>
             <a:fld id="{E36E30D0-BB55-4C9C-972F-6DBF27EB2367}" type="datetimeFigureOut">
               <a:rPr lang="en-IN" smtClean="0"/>
-              <a:t>17-12-2025</a:t>
+              <a:t>11-01-2026</a:t>
             </a:fld>
             <a:endParaRPr lang="en-IN"/>
           </a:p>
@@ -457,7 +462,7 @@
           <a:p>
             <a:fld id="{E36E30D0-BB55-4C9C-972F-6DBF27EB2367}" type="datetimeFigureOut">
               <a:rPr lang="en-IN" smtClean="0"/>
-              <a:t>17-12-2025</a:t>
+              <a:t>11-01-2026</a:t>
             </a:fld>
             <a:endParaRPr lang="en-IN"/>
           </a:p>
@@ -667,7 +672,7 @@
           <a:p>
             <a:fld id="{E36E30D0-BB55-4C9C-972F-6DBF27EB2367}" type="datetimeFigureOut">
               <a:rPr lang="en-IN" smtClean="0"/>
-              <a:t>17-12-2025</a:t>
+              <a:t>11-01-2026</a:t>
             </a:fld>
             <a:endParaRPr lang="en-IN"/>
           </a:p>
@@ -867,7 +872,7 @@
           <a:p>
             <a:fld id="{E36E30D0-BB55-4C9C-972F-6DBF27EB2367}" type="datetimeFigureOut">
               <a:rPr lang="en-IN" smtClean="0"/>
-              <a:t>17-12-2025</a:t>
+              <a:t>11-01-2026</a:t>
             </a:fld>
             <a:endParaRPr lang="en-IN"/>
           </a:p>
@@ -1143,7 +1148,7 @@
           <a:p>
             <a:fld id="{E36E30D0-BB55-4C9C-972F-6DBF27EB2367}" type="datetimeFigureOut">
               <a:rPr lang="en-IN" smtClean="0"/>
-              <a:t>17-12-2025</a:t>
+              <a:t>11-01-2026</a:t>
             </a:fld>
             <a:endParaRPr lang="en-IN"/>
           </a:p>
@@ -1411,7 +1416,7 @@
           <a:p>
             <a:fld id="{E36E30D0-BB55-4C9C-972F-6DBF27EB2367}" type="datetimeFigureOut">
               <a:rPr lang="en-IN" smtClean="0"/>
-              <a:t>17-12-2025</a:t>
+              <a:t>11-01-2026</a:t>
             </a:fld>
             <a:endParaRPr lang="en-IN"/>
           </a:p>
@@ -1826,7 +1831,7 @@
           <a:p>
             <a:fld id="{E36E30D0-BB55-4C9C-972F-6DBF27EB2367}" type="datetimeFigureOut">
               <a:rPr lang="en-IN" smtClean="0"/>
-              <a:t>17-12-2025</a:t>
+              <a:t>11-01-2026</a:t>
             </a:fld>
             <a:endParaRPr lang="en-IN"/>
           </a:p>
@@ -1968,7 +1973,7 @@
           <a:p>
             <a:fld id="{E36E30D0-BB55-4C9C-972F-6DBF27EB2367}" type="datetimeFigureOut">
               <a:rPr lang="en-IN" smtClean="0"/>
-              <a:t>17-12-2025</a:t>
+              <a:t>11-01-2026</a:t>
             </a:fld>
             <a:endParaRPr lang="en-IN"/>
           </a:p>
@@ -2081,7 +2086,7 @@
           <a:p>
             <a:fld id="{E36E30D0-BB55-4C9C-972F-6DBF27EB2367}" type="datetimeFigureOut">
               <a:rPr lang="en-IN" smtClean="0"/>
-              <a:t>17-12-2025</a:t>
+              <a:t>11-01-2026</a:t>
             </a:fld>
             <a:endParaRPr lang="en-IN"/>
           </a:p>
@@ -2394,7 +2399,7 @@
           <a:p>
             <a:fld id="{E36E30D0-BB55-4C9C-972F-6DBF27EB2367}" type="datetimeFigureOut">
               <a:rPr lang="en-IN" smtClean="0"/>
-              <a:t>17-12-2025</a:t>
+              <a:t>11-01-2026</a:t>
             </a:fld>
             <a:endParaRPr lang="en-IN"/>
           </a:p>
@@ -2683,7 +2688,7 @@
           <a:p>
             <a:fld id="{E36E30D0-BB55-4C9C-972F-6DBF27EB2367}" type="datetimeFigureOut">
               <a:rPr lang="en-IN" smtClean="0"/>
-              <a:t>17-12-2025</a:t>
+              <a:t>11-01-2026</a:t>
             </a:fld>
             <a:endParaRPr lang="en-IN"/>
           </a:p>
@@ -2926,7 +2931,7 @@
           <a:p>
             <a:fld id="{E36E30D0-BB55-4C9C-972F-6DBF27EB2367}" type="datetimeFigureOut">
               <a:rPr lang="en-IN" smtClean="0"/>
-              <a:t>17-12-2025</a:t>
+              <a:t>11-01-2026</a:t>
             </a:fld>
             <a:endParaRPr lang="en-IN"/>
           </a:p>
@@ -3428,10 +3433,10 @@
       </p:grpSpPr>
       <p:sp>
         <p:nvSpPr>
-          <p:cNvPr id="20" name="Oval 19">
-            <a:extLst>
-              <a:ext uri="{FF2B5EF4-FFF2-40B4-BE49-F238E27FC236}">
-                <a16:creationId xmlns:a16="http://schemas.microsoft.com/office/drawing/2014/main" id="{8D30536B-F4FB-B5D9-8C8F-4462A9BE5F6B}"/>
+          <p:cNvPr id="4" name="Rectangle: Rounded Corners 3">
+            <a:extLst>
+              <a:ext uri="{FF2B5EF4-FFF2-40B4-BE49-F238E27FC236}">
+                <a16:creationId xmlns:a16="http://schemas.microsoft.com/office/drawing/2014/main" id="{CEE12CDD-0165-8C47-3A9C-233576FBA155}"/>
               </a:ext>
             </a:extLst>
           </p:cNvPr>
@@ -3440,54 +3445,8 @@
         </p:nvSpPr>
         <p:spPr>
           <a:xfrm>
-            <a:off x="6433457" y="2982686"/>
-            <a:ext cx="1774372" cy="1556657"/>
-          </a:xfrm>
-          <a:prstGeom prst="ellipse">
-            <a:avLst/>
-          </a:prstGeom>
-        </p:spPr>
-        <p:style>
-          <a:lnRef idx="2">
-            <a:schemeClr val="accent1">
-              <a:shade val="15000"/>
-            </a:schemeClr>
-          </a:lnRef>
-          <a:fillRef idx="1">
-            <a:schemeClr val="accent1"/>
-          </a:fillRef>
-          <a:effectRef idx="0">
-            <a:schemeClr val="accent1"/>
-          </a:effectRef>
-          <a:fontRef idx="minor">
-            <a:schemeClr val="lt1"/>
-          </a:fontRef>
-        </p:style>
-        <p:txBody>
-          <a:bodyPr rtlCol="0" anchor="ctr"/>
-          <a:lstStyle/>
-          <a:p>
-            <a:pPr algn="ctr"/>
-            <a:endParaRPr lang="en-IN"/>
-          </a:p>
-        </p:txBody>
-      </p:sp>
-      <p:sp>
-        <p:nvSpPr>
-          <p:cNvPr id="4" name="Rectangle: Rounded Corners 3">
-            <a:extLst>
-              <a:ext uri="{FF2B5EF4-FFF2-40B4-BE49-F238E27FC236}">
-                <a16:creationId xmlns:a16="http://schemas.microsoft.com/office/drawing/2014/main" id="{CEE12CDD-0165-8C47-3A9C-233576FBA155}"/>
-              </a:ext>
-            </a:extLst>
-          </p:cNvPr>
-          <p:cNvSpPr/>
-          <p:nvPr/>
-        </p:nvSpPr>
-        <p:spPr>
-          <a:xfrm>
-            <a:off x="2939143" y="1298932"/>
-            <a:ext cx="7794171" cy="5007429"/>
+            <a:off x="1817915" y="1257299"/>
+            <a:ext cx="8915400" cy="5007429"/>
           </a:xfrm>
           <a:prstGeom prst="roundRect">
             <a:avLst/>
@@ -3502,6 +3461,50 @@
           </a:fillRef>
           <a:effectRef idx="0">
             <a:schemeClr val="accent2"/>
+          </a:effectRef>
+          <a:fontRef idx="minor">
+            <a:schemeClr val="dk1"/>
+          </a:fontRef>
+        </p:style>
+        <p:txBody>
+          <a:bodyPr rtlCol="0" anchor="ctr"/>
+          <a:lstStyle/>
+          <a:p>
+            <a:pPr algn="ctr"/>
+            <a:endParaRPr lang="en-IN"/>
+          </a:p>
+        </p:txBody>
+      </p:sp>
+      <p:sp>
+        <p:nvSpPr>
+          <p:cNvPr id="20" name="Oval 19">
+            <a:extLst>
+              <a:ext uri="{FF2B5EF4-FFF2-40B4-BE49-F238E27FC236}">
+                <a16:creationId xmlns:a16="http://schemas.microsoft.com/office/drawing/2014/main" id="{8D30536B-F4FB-B5D9-8C8F-4462A9BE5F6B}"/>
+              </a:ext>
+            </a:extLst>
+          </p:cNvPr>
+          <p:cNvSpPr/>
+          <p:nvPr/>
+        </p:nvSpPr>
+        <p:spPr>
+          <a:xfrm>
+            <a:off x="6275615" y="2910180"/>
+            <a:ext cx="1774372" cy="1556657"/>
+          </a:xfrm>
+          <a:prstGeom prst="ellipse">
+            <a:avLst/>
+          </a:prstGeom>
+        </p:spPr>
+        <p:style>
+          <a:lnRef idx="2">
+            <a:schemeClr val="accent6"/>
+          </a:lnRef>
+          <a:fillRef idx="1">
+            <a:schemeClr val="lt1"/>
+          </a:fillRef>
+          <a:effectRef idx="0">
+            <a:schemeClr val="accent6"/>
           </a:effectRef>
           <a:fontRef idx="minor">
             <a:schemeClr val="dk1"/>
@@ -3671,6 +3674,45 @@
           </p:style>
         </p:cxnSp>
       </p:grpSp>
+      <p:cxnSp>
+        <p:nvCxnSpPr>
+          <p:cNvPr id="3" name="Straight Arrow Connector 2">
+            <a:extLst>
+              <a:ext uri="{FF2B5EF4-FFF2-40B4-BE49-F238E27FC236}">
+                <a16:creationId xmlns:a16="http://schemas.microsoft.com/office/drawing/2014/main" id="{B02C2FEF-AB08-1E5B-1E03-0991A808CFDF}"/>
+              </a:ext>
+            </a:extLst>
+          </p:cNvPr>
+          <p:cNvCxnSpPr/>
+          <p:nvPr/>
+        </p:nvCxnSpPr>
+        <p:spPr>
+          <a:xfrm>
+            <a:off x="5385004" y="3429000"/>
+            <a:ext cx="1600200" cy="0"/>
+          </a:xfrm>
+          <a:prstGeom prst="straightConnector1">
+            <a:avLst/>
+          </a:prstGeom>
+          <a:ln>
+            <a:tailEnd type="triangle"/>
+          </a:ln>
+        </p:spPr>
+        <p:style>
+          <a:lnRef idx="2">
+            <a:schemeClr val="accent1"/>
+          </a:lnRef>
+          <a:fillRef idx="0">
+            <a:schemeClr val="accent1"/>
+          </a:fillRef>
+          <a:effectRef idx="1">
+            <a:schemeClr val="accent1"/>
+          </a:effectRef>
+          <a:fontRef idx="minor">
+            <a:schemeClr val="tx1"/>
+          </a:fontRef>
+        </p:style>
+      </p:cxnSp>
     </p:spTree>
     <p:extLst>
       <p:ext uri="{BB962C8B-B14F-4D97-AF65-F5344CB8AC3E}">

</xml_diff>

<commit_message>
Designed a multi-dimension state space logic in PPT. We can see in date 31-01-2026
</commit_message>
<xml_diff>
--- a/070_SimpleARM/docs/scenarios.pptx
+++ b/070_SimpleARM/docs/scenarios.pptx
@@ -7,6 +7,7 @@
   <p:sldIdLst>
     <p:sldId id="256" r:id="rId2"/>
     <p:sldId id="257" r:id="rId3"/>
+    <p:sldId id="258" r:id="rId4"/>
   </p:sldIdLst>
   <p:sldSz cx="12192000" cy="6858000"/>
   <p:notesSz cx="6858000" cy="9144000"/>
@@ -262,7 +263,7 @@
           <a:p>
             <a:fld id="{E36E30D0-BB55-4C9C-972F-6DBF27EB2367}" type="datetimeFigureOut">
               <a:rPr lang="en-IN" smtClean="0"/>
-              <a:t>11-01-2026</a:t>
+              <a:t>31-01-2026</a:t>
             </a:fld>
             <a:endParaRPr lang="en-IN"/>
           </a:p>
@@ -462,7 +463,7 @@
           <a:p>
             <a:fld id="{E36E30D0-BB55-4C9C-972F-6DBF27EB2367}" type="datetimeFigureOut">
               <a:rPr lang="en-IN" smtClean="0"/>
-              <a:t>11-01-2026</a:t>
+              <a:t>31-01-2026</a:t>
             </a:fld>
             <a:endParaRPr lang="en-IN"/>
           </a:p>
@@ -672,7 +673,7 @@
           <a:p>
             <a:fld id="{E36E30D0-BB55-4C9C-972F-6DBF27EB2367}" type="datetimeFigureOut">
               <a:rPr lang="en-IN" smtClean="0"/>
-              <a:t>11-01-2026</a:t>
+              <a:t>31-01-2026</a:t>
             </a:fld>
             <a:endParaRPr lang="en-IN"/>
           </a:p>
@@ -872,7 +873,7 @@
           <a:p>
             <a:fld id="{E36E30D0-BB55-4C9C-972F-6DBF27EB2367}" type="datetimeFigureOut">
               <a:rPr lang="en-IN" smtClean="0"/>
-              <a:t>11-01-2026</a:t>
+              <a:t>31-01-2026</a:t>
             </a:fld>
             <a:endParaRPr lang="en-IN"/>
           </a:p>
@@ -1148,7 +1149,7 @@
           <a:p>
             <a:fld id="{E36E30D0-BB55-4C9C-972F-6DBF27EB2367}" type="datetimeFigureOut">
               <a:rPr lang="en-IN" smtClean="0"/>
-              <a:t>11-01-2026</a:t>
+              <a:t>31-01-2026</a:t>
             </a:fld>
             <a:endParaRPr lang="en-IN"/>
           </a:p>
@@ -1416,7 +1417,7 @@
           <a:p>
             <a:fld id="{E36E30D0-BB55-4C9C-972F-6DBF27EB2367}" type="datetimeFigureOut">
               <a:rPr lang="en-IN" smtClean="0"/>
-              <a:t>11-01-2026</a:t>
+              <a:t>31-01-2026</a:t>
             </a:fld>
             <a:endParaRPr lang="en-IN"/>
           </a:p>
@@ -1831,7 +1832,7 @@
           <a:p>
             <a:fld id="{E36E30D0-BB55-4C9C-972F-6DBF27EB2367}" type="datetimeFigureOut">
               <a:rPr lang="en-IN" smtClean="0"/>
-              <a:t>11-01-2026</a:t>
+              <a:t>31-01-2026</a:t>
             </a:fld>
             <a:endParaRPr lang="en-IN"/>
           </a:p>
@@ -1973,7 +1974,7 @@
           <a:p>
             <a:fld id="{E36E30D0-BB55-4C9C-972F-6DBF27EB2367}" type="datetimeFigureOut">
               <a:rPr lang="en-IN" smtClean="0"/>
-              <a:t>11-01-2026</a:t>
+              <a:t>31-01-2026</a:t>
             </a:fld>
             <a:endParaRPr lang="en-IN"/>
           </a:p>
@@ -2086,7 +2087,7 @@
           <a:p>
             <a:fld id="{E36E30D0-BB55-4C9C-972F-6DBF27EB2367}" type="datetimeFigureOut">
               <a:rPr lang="en-IN" smtClean="0"/>
-              <a:t>11-01-2026</a:t>
+              <a:t>31-01-2026</a:t>
             </a:fld>
             <a:endParaRPr lang="en-IN"/>
           </a:p>
@@ -2399,7 +2400,7 @@
           <a:p>
             <a:fld id="{E36E30D0-BB55-4C9C-972F-6DBF27EB2367}" type="datetimeFigureOut">
               <a:rPr lang="en-IN" smtClean="0"/>
-              <a:t>11-01-2026</a:t>
+              <a:t>31-01-2026</a:t>
             </a:fld>
             <a:endParaRPr lang="en-IN"/>
           </a:p>
@@ -2688,7 +2689,7 @@
           <a:p>
             <a:fld id="{E36E30D0-BB55-4C9C-972F-6DBF27EB2367}" type="datetimeFigureOut">
               <a:rPr lang="en-IN" smtClean="0"/>
-              <a:t>11-01-2026</a:t>
+              <a:t>31-01-2026</a:t>
             </a:fld>
             <a:endParaRPr lang="en-IN"/>
           </a:p>
@@ -2931,7 +2932,7 @@
           <a:p>
             <a:fld id="{E36E30D0-BB55-4C9C-972F-6DBF27EB2367}" type="datetimeFigureOut">
               <a:rPr lang="en-IN" smtClean="0"/>
-              <a:t>11-01-2026</a:t>
+              <a:t>31-01-2026</a:t>
             </a:fld>
             <a:endParaRPr lang="en-IN"/>
           </a:p>
@@ -3717,6 +3718,274 @@
     <p:extLst>
       <p:ext uri="{BB962C8B-B14F-4D97-AF65-F5344CB8AC3E}">
         <p14:creationId xmlns:p14="http://schemas.microsoft.com/office/powerpoint/2010/main" val="3956686987"/>
+      </p:ext>
+    </p:extLst>
+  </p:cSld>
+  <p:clrMapOvr>
+    <a:masterClrMapping/>
+  </p:clrMapOvr>
+</p:sld>
+</file>
+
+<file path=ppt/slides/slide3.xml><?xml version="1.0" encoding="utf-8"?>
+<p:sld xmlns:a="http://schemas.openxmlformats.org/drawingml/2006/main" xmlns:r="http://schemas.openxmlformats.org/officeDocument/2006/relationships" xmlns:p="http://schemas.openxmlformats.org/presentationml/2006/main">
+  <p:cSld>
+    <p:spTree>
+      <p:nvGrpSpPr>
+        <p:cNvPr id="1" name=""/>
+        <p:cNvGrpSpPr/>
+        <p:nvPr/>
+      </p:nvGrpSpPr>
+      <p:grpSpPr>
+        <a:xfrm>
+          <a:off x="0" y="0"/>
+          <a:ext cx="0" cy="0"/>
+          <a:chOff x="0" y="0"/>
+          <a:chExt cx="0" cy="0"/>
+        </a:xfrm>
+      </p:grpSpPr>
+      <p:sp>
+        <p:nvSpPr>
+          <p:cNvPr id="2" name="Title 1">
+            <a:extLst>
+              <a:ext uri="{FF2B5EF4-FFF2-40B4-BE49-F238E27FC236}">
+                <a16:creationId xmlns:a16="http://schemas.microsoft.com/office/drawing/2014/main" id="{B6A39943-5EAB-C0F9-6CA9-36F2DD3FFCBC}"/>
+              </a:ext>
+            </a:extLst>
+          </p:cNvPr>
+          <p:cNvSpPr>
+            <a:spLocks noGrp="1"/>
+          </p:cNvSpPr>
+          <p:nvPr>
+            <p:ph type="title"/>
+          </p:nvPr>
+        </p:nvSpPr>
+        <p:spPr/>
+        <p:txBody>
+          <a:bodyPr/>
+          <a:lstStyle/>
+          <a:p>
+            <a:r>
+              <a:rPr lang="en-IN" dirty="0"/>
+              <a:t>STATE-SPACE: What should be evaluation criteria</a:t>
+            </a:r>
+          </a:p>
+        </p:txBody>
+      </p:sp>
+      <p:sp>
+        <p:nvSpPr>
+          <p:cNvPr id="3" name="Content Placeholder 2">
+            <a:extLst>
+              <a:ext uri="{FF2B5EF4-FFF2-40B4-BE49-F238E27FC236}">
+                <a16:creationId xmlns:a16="http://schemas.microsoft.com/office/drawing/2014/main" id="{5BAE5800-C795-DDC9-A0A3-A7B8878C63BC}"/>
+              </a:ext>
+            </a:extLst>
+          </p:cNvPr>
+          <p:cNvSpPr>
+            <a:spLocks noGrp="1"/>
+          </p:cNvSpPr>
+          <p:nvPr>
+            <p:ph idx="1"/>
+          </p:nvPr>
+        </p:nvSpPr>
+        <p:spPr/>
+        <p:txBody>
+          <a:bodyPr>
+            <a:normAutofit fontScale="77500" lnSpcReduction="20000"/>
+          </a:bodyPr>
+          <a:lstStyle/>
+          <a:p>
+            <a:r>
+              <a:rPr lang="en-IN" dirty="0"/>
+              <a:t>Saturday, 31 January 2026</a:t>
+            </a:r>
+          </a:p>
+          <a:p>
+            <a:r>
+              <a:rPr lang="en-IN" dirty="0"/>
+              <a:t>Let solution be aircraft altitude </a:t>
+            </a:r>
+            <a:r>
+              <a:rPr lang="en-IN" dirty="0" err="1"/>
+              <a:t>a.y</a:t>
+            </a:r>
+            <a:endParaRPr lang="en-IN" dirty="0"/>
+          </a:p>
+          <a:p>
+            <a:r>
+              <a:rPr lang="en-IN" dirty="0"/>
+              <a:t>Given a scenario consisting of n systems</a:t>
+            </a:r>
+          </a:p>
+          <a:p>
+            <a:pPr lvl="1"/>
+            <a:r>
+              <a:rPr lang="en-IN" dirty="0"/>
+              <a:t>say radar r</a:t>
+            </a:r>
+          </a:p>
+          <a:p>
+            <a:pPr lvl="2"/>
+            <a:r>
+              <a:rPr lang="en-IN" dirty="0"/>
+              <a:t>and their attribute (origin x, y  and visibility-range </a:t>
+            </a:r>
+            <a:r>
+              <a:rPr lang="en-IN" dirty="0" err="1"/>
+              <a:t>vr</a:t>
+            </a:r>
+            <a:r>
+              <a:rPr lang="en-IN" dirty="0"/>
+              <a:t>)</a:t>
+            </a:r>
+          </a:p>
+          <a:p>
+            <a:pPr lvl="2"/>
+            <a:r>
+              <a:rPr lang="en-IN" dirty="0"/>
+              <a:t>and for each attribute an error band,</a:t>
+            </a:r>
+          </a:p>
+          <a:p>
+            <a:pPr lvl="3"/>
+            <a:r>
+              <a:rPr lang="en-IN" dirty="0"/>
+              <a:t> </a:t>
+            </a:r>
+            <a:r>
+              <a:rPr lang="en-IN" dirty="0" err="1"/>
+              <a:t>error_band_x</a:t>
+            </a:r>
+            <a:r>
+              <a:rPr lang="en-IN" dirty="0"/>
+              <a:t>  (</a:t>
+            </a:r>
+            <a:r>
+              <a:rPr lang="en-IN" dirty="0" err="1"/>
+              <a:t>error_y</a:t>
+            </a:r>
+            <a:r>
+              <a:rPr lang="en-IN" dirty="0"/>
+              <a:t> , </a:t>
+            </a:r>
+            <a:r>
+              <a:rPr lang="en-IN" dirty="0" err="1"/>
+              <a:t>error_vr</a:t>
+            </a:r>
+            <a:r>
+              <a:rPr lang="en-IN" dirty="0"/>
+              <a:t> can be considered as 0)</a:t>
+            </a:r>
+          </a:p>
+          <a:p>
+            <a:pPr lvl="2"/>
+            <a:r>
+              <a:rPr lang="en-IN" dirty="0"/>
+              <a:t>if n-trials are conducted by choosing each attribute, what will be fitness-metric</a:t>
+            </a:r>
+          </a:p>
+          <a:p>
+            <a:pPr lvl="1"/>
+            <a:r>
+              <a:rPr lang="en-IN" dirty="0"/>
+              <a:t>Let the system consist of  D  orthogonal dimensions d1, d2… </a:t>
+            </a:r>
+            <a:r>
+              <a:rPr lang="en-IN" dirty="0" err="1"/>
+              <a:t>dD</a:t>
+            </a:r>
+            <a:endParaRPr lang="en-IN" dirty="0"/>
+          </a:p>
+          <a:p>
+            <a:pPr lvl="2"/>
+            <a:r>
+              <a:rPr lang="en-IN" dirty="0"/>
+              <a:t>Again we decide we need  s1, s2,  ……. </a:t>
+            </a:r>
+            <a:r>
+              <a:rPr lang="en-IN" dirty="0" err="1"/>
+              <a:t>sD</a:t>
+            </a:r>
+            <a:r>
+              <a:rPr lang="en-IN" dirty="0"/>
+              <a:t>  samples from each dimension</a:t>
+            </a:r>
+          </a:p>
+          <a:p>
+            <a:pPr lvl="2"/>
+            <a:r>
+              <a:rPr lang="en-IN" dirty="0"/>
+              <a:t>dx++ (iterator over dimension) may be deterministic (with a step size) or random with given  distribution</a:t>
+            </a:r>
+          </a:p>
+          <a:p>
+            <a:pPr lvl="2"/>
+            <a:r>
+              <a:rPr lang="en-IN" dirty="0"/>
+              <a:t>Sample Space construction would be</a:t>
+            </a:r>
+          </a:p>
+          <a:p>
+            <a:pPr lvl="3"/>
+            <a:r>
+              <a:rPr lang="en-IN" dirty="0"/>
+              <a:t>for(s1 count in d1)</a:t>
+            </a:r>
+          </a:p>
+          <a:p>
+            <a:pPr marL="1371600" lvl="3" indent="0">
+              <a:buNone/>
+            </a:pPr>
+            <a:r>
+              <a:rPr lang="en-IN" dirty="0"/>
+              <a:t>     {   s1_sampe = d1++;</a:t>
+            </a:r>
+          </a:p>
+          <a:p>
+            <a:pPr marL="1371600" lvl="3" indent="0">
+              <a:buNone/>
+            </a:pPr>
+            <a:r>
+              <a:rPr lang="en-IN" dirty="0"/>
+              <a:t>             for (s2 count in d2) s2_sample = d2++;</a:t>
+            </a:r>
+          </a:p>
+          <a:p>
+            <a:pPr marL="1371600" lvl="3" indent="0">
+              <a:buNone/>
+            </a:pPr>
+            <a:r>
+              <a:rPr lang="en-IN" dirty="0"/>
+              <a:t>                    ……</a:t>
+            </a:r>
+          </a:p>
+          <a:p>
+            <a:pPr marL="1371600" lvl="3" indent="0">
+              <a:buNone/>
+            </a:pPr>
+            <a:r>
+              <a:rPr lang="en-IN" dirty="0"/>
+              <a:t>                        fitness = f (s1_sample, s2_sample, …….</a:t>
+            </a:r>
+            <a:r>
+              <a:rPr lang="en-IN" dirty="0" err="1"/>
+              <a:t>sn_sample</a:t>
+            </a:r>
+            <a:r>
+              <a:rPr lang="en-IN" dirty="0"/>
+              <a:t>)</a:t>
+            </a:r>
+          </a:p>
+          <a:p>
+            <a:pPr lvl="2"/>
+            <a:endParaRPr lang="en-IN" dirty="0"/>
+          </a:p>
+        </p:txBody>
+      </p:sp>
+    </p:spTree>
+    <p:extLst>
+      <p:ext uri="{BB962C8B-B14F-4D97-AF65-F5344CB8AC3E}">
+        <p14:creationId xmlns:p14="http://schemas.microsoft.com/office/powerpoint/2010/main" val="2339506887"/>
       </p:ext>
     </p:extLst>
   </p:cSld>

</xml_diff>

<commit_message>
Refined State Space Logic in PPT. Now how each attribute has to be varied has been speciified in little bit more detail
</commit_message>
<xml_diff>
--- a/070_SimpleARM/docs/scenarios.pptx
+++ b/070_SimpleARM/docs/scenarios.pptx
@@ -8,6 +8,7 @@
     <p:sldId id="256" r:id="rId2"/>
     <p:sldId id="257" r:id="rId3"/>
     <p:sldId id="258" r:id="rId4"/>
+    <p:sldId id="259" r:id="rId5"/>
   </p:sldIdLst>
   <p:sldSz cx="12192000" cy="6858000"/>
   <p:notesSz cx="6858000" cy="9144000"/>
@@ -263,7 +264,7 @@
           <a:p>
             <a:fld id="{E36E30D0-BB55-4C9C-972F-6DBF27EB2367}" type="datetimeFigureOut">
               <a:rPr lang="en-IN" smtClean="0"/>
-              <a:t>31-01-2026</a:t>
+              <a:t>06-02-2026</a:t>
             </a:fld>
             <a:endParaRPr lang="en-IN"/>
           </a:p>
@@ -463,7 +464,7 @@
           <a:p>
             <a:fld id="{E36E30D0-BB55-4C9C-972F-6DBF27EB2367}" type="datetimeFigureOut">
               <a:rPr lang="en-IN" smtClean="0"/>
-              <a:t>31-01-2026</a:t>
+              <a:t>06-02-2026</a:t>
             </a:fld>
             <a:endParaRPr lang="en-IN"/>
           </a:p>
@@ -673,7 +674,7 @@
           <a:p>
             <a:fld id="{E36E30D0-BB55-4C9C-972F-6DBF27EB2367}" type="datetimeFigureOut">
               <a:rPr lang="en-IN" smtClean="0"/>
-              <a:t>31-01-2026</a:t>
+              <a:t>06-02-2026</a:t>
             </a:fld>
             <a:endParaRPr lang="en-IN"/>
           </a:p>
@@ -873,7 +874,7 @@
           <a:p>
             <a:fld id="{E36E30D0-BB55-4C9C-972F-6DBF27EB2367}" type="datetimeFigureOut">
               <a:rPr lang="en-IN" smtClean="0"/>
-              <a:t>31-01-2026</a:t>
+              <a:t>06-02-2026</a:t>
             </a:fld>
             <a:endParaRPr lang="en-IN"/>
           </a:p>
@@ -1149,7 +1150,7 @@
           <a:p>
             <a:fld id="{E36E30D0-BB55-4C9C-972F-6DBF27EB2367}" type="datetimeFigureOut">
               <a:rPr lang="en-IN" smtClean="0"/>
-              <a:t>31-01-2026</a:t>
+              <a:t>06-02-2026</a:t>
             </a:fld>
             <a:endParaRPr lang="en-IN"/>
           </a:p>
@@ -1417,7 +1418,7 @@
           <a:p>
             <a:fld id="{E36E30D0-BB55-4C9C-972F-6DBF27EB2367}" type="datetimeFigureOut">
               <a:rPr lang="en-IN" smtClean="0"/>
-              <a:t>31-01-2026</a:t>
+              <a:t>06-02-2026</a:t>
             </a:fld>
             <a:endParaRPr lang="en-IN"/>
           </a:p>
@@ -1832,7 +1833,7 @@
           <a:p>
             <a:fld id="{E36E30D0-BB55-4C9C-972F-6DBF27EB2367}" type="datetimeFigureOut">
               <a:rPr lang="en-IN" smtClean="0"/>
-              <a:t>31-01-2026</a:t>
+              <a:t>06-02-2026</a:t>
             </a:fld>
             <a:endParaRPr lang="en-IN"/>
           </a:p>
@@ -1974,7 +1975,7 @@
           <a:p>
             <a:fld id="{E36E30D0-BB55-4C9C-972F-6DBF27EB2367}" type="datetimeFigureOut">
               <a:rPr lang="en-IN" smtClean="0"/>
-              <a:t>31-01-2026</a:t>
+              <a:t>06-02-2026</a:t>
             </a:fld>
             <a:endParaRPr lang="en-IN"/>
           </a:p>
@@ -2087,7 +2088,7 @@
           <a:p>
             <a:fld id="{E36E30D0-BB55-4C9C-972F-6DBF27EB2367}" type="datetimeFigureOut">
               <a:rPr lang="en-IN" smtClean="0"/>
-              <a:t>31-01-2026</a:t>
+              <a:t>06-02-2026</a:t>
             </a:fld>
             <a:endParaRPr lang="en-IN"/>
           </a:p>
@@ -2400,7 +2401,7 @@
           <a:p>
             <a:fld id="{E36E30D0-BB55-4C9C-972F-6DBF27EB2367}" type="datetimeFigureOut">
               <a:rPr lang="en-IN" smtClean="0"/>
-              <a:t>31-01-2026</a:t>
+              <a:t>06-02-2026</a:t>
             </a:fld>
             <a:endParaRPr lang="en-IN"/>
           </a:p>
@@ -2689,7 +2690,7 @@
           <a:p>
             <a:fld id="{E36E30D0-BB55-4C9C-972F-6DBF27EB2367}" type="datetimeFigureOut">
               <a:rPr lang="en-IN" smtClean="0"/>
-              <a:t>31-01-2026</a:t>
+              <a:t>06-02-2026</a:t>
             </a:fld>
             <a:endParaRPr lang="en-IN"/>
           </a:p>
@@ -2932,7 +2933,7 @@
           <a:p>
             <a:fld id="{E36E30D0-BB55-4C9C-972F-6DBF27EB2367}" type="datetimeFigureOut">
               <a:rPr lang="en-IN" smtClean="0"/>
-              <a:t>31-01-2026</a:t>
+              <a:t>06-02-2026</a:t>
             </a:fld>
             <a:endParaRPr lang="en-IN"/>
           </a:p>
@@ -3762,13 +3763,22 @@
         </p:nvSpPr>
         <p:spPr/>
         <p:txBody>
-          <a:bodyPr/>
-          <a:lstStyle/>
-          <a:p>
-            <a:r>
+          <a:bodyPr>
+            <a:normAutofit fontScale="90000"/>
+          </a:bodyPr>
+          <a:lstStyle/>
+          <a:p>
+            <a:br>
               <a:rPr lang="en-IN" dirty="0"/>
-              <a:t>STATE-SPACE: What should be evaluation criteria</a:t>
-            </a:r>
+            </a:br>
+            <a:r>
+              <a:rPr lang="en-IN" dirty="0"/>
+              <a:t>STATE-SPACE: What should be evaluation criteria (Friday, 06 February 2026)</a:t>
+            </a:r>
+            <a:br>
+              <a:rPr lang="en-IN" dirty="0"/>
+            </a:br>
+            <a:endParaRPr lang="en-IN" dirty="0"/>
           </a:p>
         </p:txBody>
       </p:sp>
@@ -3791,15 +3801,9 @@
         <p:spPr/>
         <p:txBody>
           <a:bodyPr>
-            <a:normAutofit fontScale="77500" lnSpcReduction="20000"/>
+            <a:normAutofit lnSpcReduction="10000"/>
           </a:bodyPr>
           <a:lstStyle/>
-          <a:p>
-            <a:r>
-              <a:rPr lang="en-IN" dirty="0"/>
-              <a:t>Saturday, 31 January 2026</a:t>
-            </a:r>
-          </a:p>
           <a:p>
             <a:r>
               <a:rPr lang="en-IN" dirty="0"/>
@@ -3840,41 +3844,85 @@
             </a:r>
           </a:p>
           <a:p>
+            <a:pPr lvl="1"/>
+            <a:r>
+              <a:rPr lang="en-IN" dirty="0"/>
+              <a:t>We have to find solution for aircraft’s  height </a:t>
+            </a:r>
+            <a:r>
+              <a:rPr lang="en-IN" dirty="0" err="1"/>
+              <a:t>a.y</a:t>
+            </a:r>
+            <a:r>
+              <a:rPr lang="en-IN" dirty="0"/>
+              <a:t>  so that  its detection by radar is minimal</a:t>
+            </a:r>
+          </a:p>
+          <a:p>
+            <a:pPr lvl="1"/>
+            <a:r>
+              <a:rPr lang="en-IN" dirty="0"/>
+              <a:t>optimal_y = (</a:t>
+            </a:r>
+            <a:r>
+              <a:rPr lang="en-IN" dirty="0" err="1"/>
+              <a:t>a.y</a:t>
+            </a:r>
+            <a:r>
+              <a:rPr lang="en-IN" dirty="0"/>
+              <a:t> | min(detections(</a:t>
+            </a:r>
+            <a:r>
+              <a:rPr lang="en-IN" dirty="0" err="1"/>
+              <a:t>a.x</a:t>
+            </a:r>
+            <a:r>
+              <a:rPr lang="en-IN" dirty="0"/>
+              <a:t> = begin to end, radar,  </a:t>
+            </a:r>
+            <a:r>
+              <a:rPr lang="en-IN" dirty="0" err="1"/>
+              <a:t>a.y</a:t>
+            </a:r>
+            <a:r>
+              <a:rPr lang="en-IN" dirty="0"/>
+              <a:t>)))</a:t>
+            </a:r>
+          </a:p>
+          <a:p>
+            <a:pPr lvl="1"/>
+            <a:r>
+              <a:rPr lang="en-IN" dirty="0"/>
+              <a:t>evaluate solution(</a:t>
+            </a:r>
+            <a:r>
+              <a:rPr lang="en-IN" dirty="0" err="1"/>
+              <a:t>a.y</a:t>
+            </a:r>
+            <a:r>
+              <a:rPr lang="en-IN" dirty="0"/>
+              <a:t>)</a:t>
+            </a:r>
+          </a:p>
+          <a:p>
             <a:pPr lvl="2"/>
             <a:r>
               <a:rPr lang="en-IN" dirty="0"/>
-              <a:t>and for each attribute an error band,</a:t>
+              <a:t>for attribute_value = attribute_min to attribute_max in attribute_step</a:t>
             </a:r>
           </a:p>
           <a:p>
             <a:pPr lvl="3"/>
             <a:r>
               <a:rPr lang="en-IN" dirty="0"/>
-              <a:t> </a:t>
-            </a:r>
-            <a:r>
-              <a:rPr lang="en-IN" dirty="0" err="1"/>
-              <a:t>error_band_x</a:t>
-            </a:r>
+              <a:t>attribute_error  = randomly pick a value from (attribute-error-band)</a:t>
+            </a:r>
+          </a:p>
+          <a:p>
+            <a:pPr lvl="3"/>
             <a:r>
               <a:rPr lang="en-IN" dirty="0"/>
-              <a:t>  (</a:t>
-            </a:r>
-            <a:r>
-              <a:rPr lang="en-IN" dirty="0" err="1"/>
-              <a:t>error_y</a:t>
-            </a:r>
-            <a:r>
-              <a:rPr lang="en-IN" dirty="0"/>
-              <a:t> , </a:t>
-            </a:r>
-            <a:r>
-              <a:rPr lang="en-IN" dirty="0" err="1"/>
-              <a:t>error_vr</a:t>
-            </a:r>
-            <a:r>
-              <a:rPr lang="en-IN" dirty="0"/>
-              <a:t> can be considered as 0)</a:t>
+              <a:t>attribute_value = attribute_value +/-  error</a:t>
             </a:r>
           </a:p>
           <a:p>
@@ -3882,98 +3930,6 @@
             <a:r>
               <a:rPr lang="en-IN" dirty="0"/>
               <a:t>if n-trials are conducted by choosing each attribute, what will be fitness-metric</a:t>
-            </a:r>
-          </a:p>
-          <a:p>
-            <a:pPr lvl="1"/>
-            <a:r>
-              <a:rPr lang="en-IN" dirty="0"/>
-              <a:t>Let the system consist of  D  orthogonal dimensions d1, d2… </a:t>
-            </a:r>
-            <a:r>
-              <a:rPr lang="en-IN" dirty="0" err="1"/>
-              <a:t>dD</a:t>
-            </a:r>
-            <a:endParaRPr lang="en-IN" dirty="0"/>
-          </a:p>
-          <a:p>
-            <a:pPr lvl="2"/>
-            <a:r>
-              <a:rPr lang="en-IN" dirty="0"/>
-              <a:t>Again we decide we need  s1, s2,  ……. </a:t>
-            </a:r>
-            <a:r>
-              <a:rPr lang="en-IN" dirty="0" err="1"/>
-              <a:t>sD</a:t>
-            </a:r>
-            <a:r>
-              <a:rPr lang="en-IN" dirty="0"/>
-              <a:t>  samples from each dimension</a:t>
-            </a:r>
-          </a:p>
-          <a:p>
-            <a:pPr lvl="2"/>
-            <a:r>
-              <a:rPr lang="en-IN" dirty="0"/>
-              <a:t>dx++ (iterator over dimension) may be deterministic (with a step size) or random with given  distribution</a:t>
-            </a:r>
-          </a:p>
-          <a:p>
-            <a:pPr lvl="2"/>
-            <a:r>
-              <a:rPr lang="en-IN" dirty="0"/>
-              <a:t>Sample Space construction would be</a:t>
-            </a:r>
-          </a:p>
-          <a:p>
-            <a:pPr lvl="3"/>
-            <a:r>
-              <a:rPr lang="en-IN" dirty="0"/>
-              <a:t>for(s1 count in d1)</a:t>
-            </a:r>
-          </a:p>
-          <a:p>
-            <a:pPr marL="1371600" lvl="3" indent="0">
-              <a:buNone/>
-            </a:pPr>
-            <a:r>
-              <a:rPr lang="en-IN" dirty="0"/>
-              <a:t>     {   s1_sampe = d1++;</a:t>
-            </a:r>
-          </a:p>
-          <a:p>
-            <a:pPr marL="1371600" lvl="3" indent="0">
-              <a:buNone/>
-            </a:pPr>
-            <a:r>
-              <a:rPr lang="en-IN" dirty="0"/>
-              <a:t>             for (s2 count in d2) s2_sample = d2++;</a:t>
-            </a:r>
-          </a:p>
-          <a:p>
-            <a:pPr marL="1371600" lvl="3" indent="0">
-              <a:buNone/>
-            </a:pPr>
-            <a:r>
-              <a:rPr lang="en-IN" dirty="0"/>
-              <a:t>                    ……</a:t>
-            </a:r>
-          </a:p>
-          <a:p>
-            <a:pPr marL="1371600" lvl="3" indent="0">
-              <a:buNone/>
-            </a:pPr>
-            <a:r>
-              <a:rPr lang="en-IN" dirty="0"/>
-              <a:t>                        fitness = f (s1_sample, s2_sample, …….</a:t>
-            </a:r>
-            <a:r>
-              <a:rPr lang="en-IN" dirty="0" err="1"/>
-              <a:t>sn_sample</a:t>
-            </a:r>
-            <a:r>
-              <a:rPr lang="en-IN" dirty="0"/>
-              <a:t>)</a:t>
             </a:r>
           </a:p>
           <a:p>
@@ -3986,6 +3942,177 @@
     <p:extLst>
       <p:ext uri="{BB962C8B-B14F-4D97-AF65-F5344CB8AC3E}">
         <p14:creationId xmlns:p14="http://schemas.microsoft.com/office/powerpoint/2010/main" val="2339506887"/>
+      </p:ext>
+    </p:extLst>
+  </p:cSld>
+  <p:clrMapOvr>
+    <a:masterClrMapping/>
+  </p:clrMapOvr>
+</p:sld>
+</file>
+
+<file path=ppt/slides/slide4.xml><?xml version="1.0" encoding="utf-8"?>
+<p:sld xmlns:a="http://schemas.openxmlformats.org/drawingml/2006/main" xmlns:r="http://schemas.openxmlformats.org/officeDocument/2006/relationships" xmlns:p="http://schemas.openxmlformats.org/presentationml/2006/main">
+  <p:cSld>
+    <p:spTree>
+      <p:nvGrpSpPr>
+        <p:cNvPr id="1" name=""/>
+        <p:cNvGrpSpPr/>
+        <p:nvPr/>
+      </p:nvGrpSpPr>
+      <p:grpSpPr>
+        <a:xfrm>
+          <a:off x="0" y="0"/>
+          <a:ext cx="0" cy="0"/>
+          <a:chOff x="0" y="0"/>
+          <a:chExt cx="0" cy="0"/>
+        </a:xfrm>
+      </p:grpSpPr>
+      <p:sp>
+        <p:nvSpPr>
+          <p:cNvPr id="2" name="Title 1">
+            <a:extLst>
+              <a:ext uri="{FF2B5EF4-FFF2-40B4-BE49-F238E27FC236}">
+                <a16:creationId xmlns:a16="http://schemas.microsoft.com/office/drawing/2014/main" id="{CD941424-3B43-57F8-FF80-54EA9C731E9D}"/>
+              </a:ext>
+            </a:extLst>
+          </p:cNvPr>
+          <p:cNvSpPr>
+            <a:spLocks noGrp="1"/>
+          </p:cNvSpPr>
+          <p:nvPr>
+            <p:ph type="title"/>
+          </p:nvPr>
+        </p:nvSpPr>
+        <p:spPr/>
+        <p:txBody>
+          <a:bodyPr/>
+          <a:lstStyle/>
+          <a:p>
+            <a:r>
+              <a:rPr lang="en-IN" dirty="0"/>
+              <a:t>Friday, 06 February 2026</a:t>
+            </a:r>
+            <a:br>
+              <a:rPr lang="en-IN" dirty="0"/>
+            </a:br>
+            <a:endParaRPr lang="en-IN" dirty="0"/>
+          </a:p>
+        </p:txBody>
+      </p:sp>
+      <p:sp>
+        <p:nvSpPr>
+          <p:cNvPr id="3" name="Content Placeholder 2">
+            <a:extLst>
+              <a:ext uri="{FF2B5EF4-FFF2-40B4-BE49-F238E27FC236}">
+                <a16:creationId xmlns:a16="http://schemas.microsoft.com/office/drawing/2014/main" id="{8E8B312A-A3F4-16F2-B4C4-C6213C64283A}"/>
+              </a:ext>
+            </a:extLst>
+          </p:cNvPr>
+          <p:cNvSpPr>
+            <a:spLocks noGrp="1"/>
+          </p:cNvSpPr>
+          <p:nvPr>
+            <p:ph idx="1"/>
+          </p:nvPr>
+        </p:nvSpPr>
+        <p:spPr/>
+        <p:txBody>
+          <a:bodyPr/>
+          <a:lstStyle/>
+          <a:p>
+            <a:pPr lvl="1"/>
+            <a:r>
+              <a:rPr lang="en-IN" dirty="0"/>
+              <a:t>Let the system consist of  D  orthogonal dimensions d1, d2… </a:t>
+            </a:r>
+            <a:r>
+              <a:rPr lang="en-IN" dirty="0" err="1"/>
+              <a:t>dD</a:t>
+            </a:r>
+            <a:endParaRPr lang="en-IN" dirty="0"/>
+          </a:p>
+          <a:p>
+            <a:pPr lvl="2"/>
+            <a:r>
+              <a:rPr lang="en-IN" dirty="0"/>
+              <a:t>Again we decide we need  s1, s2,  ……. </a:t>
+            </a:r>
+            <a:r>
+              <a:rPr lang="en-IN" dirty="0" err="1"/>
+              <a:t>sD</a:t>
+            </a:r>
+            <a:r>
+              <a:rPr lang="en-IN" dirty="0"/>
+              <a:t>  samples from each dimension</a:t>
+            </a:r>
+          </a:p>
+          <a:p>
+            <a:pPr lvl="2"/>
+            <a:r>
+              <a:rPr lang="en-IN" dirty="0"/>
+              <a:t>dx++ (iterator over dimension) may be deterministic (with a step size) or random with given  distribution</a:t>
+            </a:r>
+          </a:p>
+          <a:p>
+            <a:pPr lvl="2"/>
+            <a:r>
+              <a:rPr lang="en-IN" dirty="0"/>
+              <a:t>Sample Space construction would be</a:t>
+            </a:r>
+          </a:p>
+          <a:p>
+            <a:pPr lvl="3"/>
+            <a:r>
+              <a:rPr lang="en-IN" dirty="0"/>
+              <a:t>for(s1 count in d1)</a:t>
+            </a:r>
+          </a:p>
+          <a:p>
+            <a:pPr marL="1371600" lvl="3" indent="0">
+              <a:buNone/>
+            </a:pPr>
+            <a:r>
+              <a:rPr lang="en-IN" dirty="0"/>
+              <a:t>     {   s1_sampe = d1++;</a:t>
+            </a:r>
+          </a:p>
+          <a:p>
+            <a:pPr marL="1371600" lvl="3" indent="0">
+              <a:buNone/>
+            </a:pPr>
+            <a:r>
+              <a:rPr lang="en-IN" dirty="0"/>
+              <a:t>             for (s2 count in d2) s2_sample = d2++;</a:t>
+            </a:r>
+          </a:p>
+          <a:p>
+            <a:pPr marL="1371600" lvl="3" indent="0">
+              <a:buNone/>
+            </a:pPr>
+            <a:r>
+              <a:rPr lang="en-IN" dirty="0"/>
+              <a:t>                    ……</a:t>
+            </a:r>
+          </a:p>
+          <a:p>
+            <a:pPr marL="1371600" lvl="3" indent="0">
+              <a:buNone/>
+            </a:pPr>
+            <a:r>
+              <a:rPr lang="en-IN" dirty="0"/>
+              <a:t>                        fitness = f (s1_sample, s2_sample, …….sn_sample)</a:t>
+            </a:r>
+          </a:p>
+          <a:p>
+            <a:endParaRPr lang="en-IN" dirty="0"/>
+          </a:p>
+        </p:txBody>
+      </p:sp>
+    </p:spTree>
+    <p:extLst>
+      <p:ext uri="{BB962C8B-B14F-4D97-AF65-F5344CB8AC3E}">
+        <p14:creationId xmlns:p14="http://schemas.microsoft.com/office/powerpoint/2010/main" val="2202378817"/>
       </p:ext>
     </p:extLst>
   </p:cSld>

</xml_diff>